<commit_message>
Switched to PyMuPDF for pdf imports and flattening.
</commit_message>
<xml_diff>
--- a/test/test_data/output.pptx
+++ b/test/test_data/output.pptx
@@ -9,6 +9,15 @@
     <p:sldId id="257" r:id="rId8"/>
     <p:sldId id="258" r:id="rId9"/>
     <p:sldId id="259" r:id="rId10"/>
+    <p:sldId id="260" r:id="rId11"/>
+    <p:sldId id="261" r:id="rId12"/>
+    <p:sldId id="262" r:id="rId13"/>
+    <p:sldId id="263" r:id="rId14"/>
+    <p:sldId id="264" r:id="rId15"/>
+    <p:sldId id="265" r:id="rId16"/>
+    <p:sldId id="266" r:id="rId17"/>
+    <p:sldId id="267" r:id="rId18"/>
+    <p:sldId id="268" r:id="rId19"/>
   </p:sldIdLst>
   <p:sldSz cx="9144000" cy="6858000" type="screen4x3"/>
   <p:notesSz cx="6858000" cy="9144000"/>
@@ -3110,7 +3119,7 @@
       </p:sp>
       <p:pic>
         <p:nvPicPr>
-          <p:cNvPr id="3" name="Picture 2" descr="test_page-0001.jpg"/>
+          <p:cNvPr id="3" name="Picture 2" descr="temp_img.jpg"/>
           <p:cNvPicPr>
             <a:picLocks noChangeAspect="1"/>
           </p:cNvPicPr>
@@ -3124,8 +3133,244 @@
         </p:blipFill>
         <p:spPr>
           <a:xfrm>
-            <a:off x="914400" y="914400"/>
-            <a:ext cx="5486400" cy="4114800"/>
+            <a:off x="0" y="0"/>
+            <a:ext cx="9144000" cy="6858000"/>
+          </a:xfrm>
+          <a:prstGeom prst="rect">
+            <a:avLst/>
+          </a:prstGeom>
+        </p:spPr>
+      </p:pic>
+    </p:spTree>
+  </p:cSld>
+  <p:clrMapOvr>
+    <a:masterClrMapping/>
+  </p:clrMapOvr>
+</p:sld>
+</file>
+
+<file path=ppt/slides/slide10.xml><?xml version="1.0" encoding="utf-8"?>
+<p:sld xmlns:a="http://schemas.openxmlformats.org/drawingml/2006/main" xmlns:p="http://schemas.openxmlformats.org/presentationml/2006/main" xmlns:r="http://schemas.openxmlformats.org/officeDocument/2006/relationships">
+  <p:cSld>
+    <p:spTree>
+      <p:nvGrpSpPr>
+        <p:cNvPr id="1" name=""/>
+        <p:cNvGrpSpPr/>
+        <p:nvPr/>
+      </p:nvGrpSpPr>
+      <p:grpSpPr/>
+      <p:sp>
+        <p:nvSpPr>
+          <p:cNvPr id="2" name="Title 1"/>
+          <p:cNvSpPr>
+            <a:spLocks noGrp="1"/>
+          </p:cNvSpPr>
+          <p:nvPr>
+            <p:ph type="title"/>
+          </p:nvPr>
+        </p:nvSpPr>
+        <p:spPr/>
+        <p:txBody>
+          <a:bodyPr/>
+          <a:lstStyle/>
+          <a:p/>
+        </p:txBody>
+      </p:sp>
+      <p:pic>
+        <p:nvPicPr>
+          <p:cNvPr id="3" name="Picture 2" descr="temp_img.jpg"/>
+          <p:cNvPicPr>
+            <a:picLocks noChangeAspect="1"/>
+          </p:cNvPicPr>
+          <p:nvPr/>
+        </p:nvPicPr>
+        <p:blipFill>
+          <a:blip r:embed="rId2"/>
+          <a:stretch>
+            <a:fillRect/>
+          </a:stretch>
+        </p:blipFill>
+        <p:spPr>
+          <a:xfrm>
+            <a:off x="0" y="0"/>
+            <a:ext cx="9144000" cy="6858000"/>
+          </a:xfrm>
+          <a:prstGeom prst="rect">
+            <a:avLst/>
+          </a:prstGeom>
+        </p:spPr>
+      </p:pic>
+    </p:spTree>
+  </p:cSld>
+  <p:clrMapOvr>
+    <a:masterClrMapping/>
+  </p:clrMapOvr>
+</p:sld>
+</file>
+
+<file path=ppt/slides/slide11.xml><?xml version="1.0" encoding="utf-8"?>
+<p:sld xmlns:a="http://schemas.openxmlformats.org/drawingml/2006/main" xmlns:p="http://schemas.openxmlformats.org/presentationml/2006/main" xmlns:r="http://schemas.openxmlformats.org/officeDocument/2006/relationships">
+  <p:cSld>
+    <p:spTree>
+      <p:nvGrpSpPr>
+        <p:cNvPr id="1" name=""/>
+        <p:cNvGrpSpPr/>
+        <p:nvPr/>
+      </p:nvGrpSpPr>
+      <p:grpSpPr/>
+      <p:sp>
+        <p:nvSpPr>
+          <p:cNvPr id="2" name="Title 1"/>
+          <p:cNvSpPr>
+            <a:spLocks noGrp="1"/>
+          </p:cNvSpPr>
+          <p:nvPr>
+            <p:ph type="title"/>
+          </p:nvPr>
+        </p:nvSpPr>
+        <p:spPr/>
+        <p:txBody>
+          <a:bodyPr/>
+          <a:lstStyle/>
+          <a:p/>
+        </p:txBody>
+      </p:sp>
+      <p:pic>
+        <p:nvPicPr>
+          <p:cNvPr id="3" name="Picture 2" descr="temp_img.jpg"/>
+          <p:cNvPicPr>
+            <a:picLocks noChangeAspect="1"/>
+          </p:cNvPicPr>
+          <p:nvPr/>
+        </p:nvPicPr>
+        <p:blipFill>
+          <a:blip r:embed="rId2"/>
+          <a:stretch>
+            <a:fillRect/>
+          </a:stretch>
+        </p:blipFill>
+        <p:spPr>
+          <a:xfrm>
+            <a:off x="0" y="0"/>
+            <a:ext cx="9144000" cy="6858000"/>
+          </a:xfrm>
+          <a:prstGeom prst="rect">
+            <a:avLst/>
+          </a:prstGeom>
+        </p:spPr>
+      </p:pic>
+    </p:spTree>
+  </p:cSld>
+  <p:clrMapOvr>
+    <a:masterClrMapping/>
+  </p:clrMapOvr>
+</p:sld>
+</file>
+
+<file path=ppt/slides/slide12.xml><?xml version="1.0" encoding="utf-8"?>
+<p:sld xmlns:a="http://schemas.openxmlformats.org/drawingml/2006/main" xmlns:p="http://schemas.openxmlformats.org/presentationml/2006/main" xmlns:r="http://schemas.openxmlformats.org/officeDocument/2006/relationships">
+  <p:cSld>
+    <p:spTree>
+      <p:nvGrpSpPr>
+        <p:cNvPr id="1" name=""/>
+        <p:cNvGrpSpPr/>
+        <p:nvPr/>
+      </p:nvGrpSpPr>
+      <p:grpSpPr/>
+      <p:sp>
+        <p:nvSpPr>
+          <p:cNvPr id="2" name="Title 1"/>
+          <p:cNvSpPr>
+            <a:spLocks noGrp="1"/>
+          </p:cNvSpPr>
+          <p:nvPr>
+            <p:ph type="title"/>
+          </p:nvPr>
+        </p:nvSpPr>
+        <p:spPr/>
+        <p:txBody>
+          <a:bodyPr/>
+          <a:lstStyle/>
+          <a:p/>
+        </p:txBody>
+      </p:sp>
+      <p:pic>
+        <p:nvPicPr>
+          <p:cNvPr id="3" name="Picture 2" descr="temp_img.jpg"/>
+          <p:cNvPicPr>
+            <a:picLocks noChangeAspect="1"/>
+          </p:cNvPicPr>
+          <p:nvPr/>
+        </p:nvPicPr>
+        <p:blipFill>
+          <a:blip r:embed="rId2"/>
+          <a:stretch>
+            <a:fillRect/>
+          </a:stretch>
+        </p:blipFill>
+        <p:spPr>
+          <a:xfrm>
+            <a:off x="0" y="0"/>
+            <a:ext cx="9144000" cy="6858000"/>
+          </a:xfrm>
+          <a:prstGeom prst="rect">
+            <a:avLst/>
+          </a:prstGeom>
+        </p:spPr>
+      </p:pic>
+    </p:spTree>
+  </p:cSld>
+  <p:clrMapOvr>
+    <a:masterClrMapping/>
+  </p:clrMapOvr>
+</p:sld>
+</file>
+
+<file path=ppt/slides/slide13.xml><?xml version="1.0" encoding="utf-8"?>
+<p:sld xmlns:a="http://schemas.openxmlformats.org/drawingml/2006/main" xmlns:p="http://schemas.openxmlformats.org/presentationml/2006/main" xmlns:r="http://schemas.openxmlformats.org/officeDocument/2006/relationships">
+  <p:cSld>
+    <p:spTree>
+      <p:nvGrpSpPr>
+        <p:cNvPr id="1" name=""/>
+        <p:cNvGrpSpPr/>
+        <p:nvPr/>
+      </p:nvGrpSpPr>
+      <p:grpSpPr/>
+      <p:sp>
+        <p:nvSpPr>
+          <p:cNvPr id="2" name="Title 1"/>
+          <p:cNvSpPr>
+            <a:spLocks noGrp="1"/>
+          </p:cNvSpPr>
+          <p:nvPr>
+            <p:ph type="title"/>
+          </p:nvPr>
+        </p:nvSpPr>
+        <p:spPr/>
+        <p:txBody>
+          <a:bodyPr/>
+          <a:lstStyle/>
+          <a:p/>
+        </p:txBody>
+      </p:sp>
+      <p:pic>
+        <p:nvPicPr>
+          <p:cNvPr id="3" name="Picture 2" descr="temp_img.jpg"/>
+          <p:cNvPicPr>
+            <a:picLocks noChangeAspect="1"/>
+          </p:cNvPicPr>
+          <p:nvPr/>
+        </p:nvPicPr>
+        <p:blipFill>
+          <a:blip r:embed="rId2"/>
+          <a:stretch>
+            <a:fillRect/>
+          </a:stretch>
+        </p:blipFill>
+        <p:spPr>
+          <a:xfrm>
+            <a:off x="0" y="0"/>
+            <a:ext cx="9144000" cy="6858000"/>
           </a:xfrm>
           <a:prstGeom prst="rect">
             <a:avLst/>
@@ -3169,7 +3414,7 @@
       </p:sp>
       <p:pic>
         <p:nvPicPr>
-          <p:cNvPr id="3" name="Picture 2" descr="test_page-0002.jpg"/>
+          <p:cNvPr id="3" name="Picture 2" descr="temp_img.jpg"/>
           <p:cNvPicPr>
             <a:picLocks noChangeAspect="1"/>
           </p:cNvPicPr>
@@ -3183,8 +3428,8 @@
         </p:blipFill>
         <p:spPr>
           <a:xfrm>
-            <a:off x="914400" y="914400"/>
-            <a:ext cx="5486400" cy="4114800"/>
+            <a:off x="0" y="0"/>
+            <a:ext cx="9144000" cy="6858000"/>
           </a:xfrm>
           <a:prstGeom prst="rect">
             <a:avLst/>
@@ -3228,7 +3473,7 @@
       </p:sp>
       <p:pic>
         <p:nvPicPr>
-          <p:cNvPr id="3" name="Picture 2" descr="test_page-0003.jpg"/>
+          <p:cNvPr id="3" name="Picture 2" descr="temp_img.jpg"/>
           <p:cNvPicPr>
             <a:picLocks noChangeAspect="1"/>
           </p:cNvPicPr>
@@ -3242,8 +3487,8 @@
         </p:blipFill>
         <p:spPr>
           <a:xfrm>
-            <a:off x="914400" y="914400"/>
-            <a:ext cx="5486400" cy="4114800"/>
+            <a:off x="0" y="0"/>
+            <a:ext cx="9144000" cy="6858000"/>
           </a:xfrm>
           <a:prstGeom prst="rect">
             <a:avLst/>
@@ -3287,7 +3532,7 @@
       </p:sp>
       <p:pic>
         <p:nvPicPr>
-          <p:cNvPr id="3" name="Picture 2" descr="test_page-0004.jpg"/>
+          <p:cNvPr id="3" name="Picture 2" descr="temp_img.jpg"/>
           <p:cNvPicPr>
             <a:picLocks noChangeAspect="1"/>
           </p:cNvPicPr>
@@ -3301,8 +3546,303 @@
         </p:blipFill>
         <p:spPr>
           <a:xfrm>
-            <a:off x="914400" y="914400"/>
-            <a:ext cx="5486400" cy="4114800"/>
+            <a:off x="0" y="0"/>
+            <a:ext cx="9144000" cy="6858000"/>
+          </a:xfrm>
+          <a:prstGeom prst="rect">
+            <a:avLst/>
+          </a:prstGeom>
+        </p:spPr>
+      </p:pic>
+    </p:spTree>
+  </p:cSld>
+  <p:clrMapOvr>
+    <a:masterClrMapping/>
+  </p:clrMapOvr>
+</p:sld>
+</file>
+
+<file path=ppt/slides/slide5.xml><?xml version="1.0" encoding="utf-8"?>
+<p:sld xmlns:a="http://schemas.openxmlformats.org/drawingml/2006/main" xmlns:p="http://schemas.openxmlformats.org/presentationml/2006/main" xmlns:r="http://schemas.openxmlformats.org/officeDocument/2006/relationships">
+  <p:cSld>
+    <p:spTree>
+      <p:nvGrpSpPr>
+        <p:cNvPr id="1" name=""/>
+        <p:cNvGrpSpPr/>
+        <p:nvPr/>
+      </p:nvGrpSpPr>
+      <p:grpSpPr/>
+      <p:sp>
+        <p:nvSpPr>
+          <p:cNvPr id="2" name="Title 1"/>
+          <p:cNvSpPr>
+            <a:spLocks noGrp="1"/>
+          </p:cNvSpPr>
+          <p:nvPr>
+            <p:ph type="title"/>
+          </p:nvPr>
+        </p:nvSpPr>
+        <p:spPr/>
+        <p:txBody>
+          <a:bodyPr/>
+          <a:lstStyle/>
+          <a:p/>
+        </p:txBody>
+      </p:sp>
+      <p:pic>
+        <p:nvPicPr>
+          <p:cNvPr id="3" name="Picture 2" descr="temp_img.jpg"/>
+          <p:cNvPicPr>
+            <a:picLocks noChangeAspect="1"/>
+          </p:cNvPicPr>
+          <p:nvPr/>
+        </p:nvPicPr>
+        <p:blipFill>
+          <a:blip r:embed="rId2"/>
+          <a:stretch>
+            <a:fillRect/>
+          </a:stretch>
+        </p:blipFill>
+        <p:spPr>
+          <a:xfrm>
+            <a:off x="0" y="0"/>
+            <a:ext cx="9144000" cy="6858000"/>
+          </a:xfrm>
+          <a:prstGeom prst="rect">
+            <a:avLst/>
+          </a:prstGeom>
+        </p:spPr>
+      </p:pic>
+    </p:spTree>
+  </p:cSld>
+  <p:clrMapOvr>
+    <a:masterClrMapping/>
+  </p:clrMapOvr>
+</p:sld>
+</file>
+
+<file path=ppt/slides/slide6.xml><?xml version="1.0" encoding="utf-8"?>
+<p:sld xmlns:a="http://schemas.openxmlformats.org/drawingml/2006/main" xmlns:p="http://schemas.openxmlformats.org/presentationml/2006/main" xmlns:r="http://schemas.openxmlformats.org/officeDocument/2006/relationships">
+  <p:cSld>
+    <p:spTree>
+      <p:nvGrpSpPr>
+        <p:cNvPr id="1" name=""/>
+        <p:cNvGrpSpPr/>
+        <p:nvPr/>
+      </p:nvGrpSpPr>
+      <p:grpSpPr/>
+      <p:sp>
+        <p:nvSpPr>
+          <p:cNvPr id="2" name="Title 1"/>
+          <p:cNvSpPr>
+            <a:spLocks noGrp="1"/>
+          </p:cNvSpPr>
+          <p:nvPr>
+            <p:ph type="title"/>
+          </p:nvPr>
+        </p:nvSpPr>
+        <p:spPr/>
+        <p:txBody>
+          <a:bodyPr/>
+          <a:lstStyle/>
+          <a:p/>
+        </p:txBody>
+      </p:sp>
+      <p:pic>
+        <p:nvPicPr>
+          <p:cNvPr id="3" name="Picture 2" descr="temp_img.jpg"/>
+          <p:cNvPicPr>
+            <a:picLocks noChangeAspect="1"/>
+          </p:cNvPicPr>
+          <p:nvPr/>
+        </p:nvPicPr>
+        <p:blipFill>
+          <a:blip r:embed="rId2"/>
+          <a:stretch>
+            <a:fillRect/>
+          </a:stretch>
+        </p:blipFill>
+        <p:spPr>
+          <a:xfrm>
+            <a:off x="0" y="0"/>
+            <a:ext cx="9144000" cy="6858000"/>
+          </a:xfrm>
+          <a:prstGeom prst="rect">
+            <a:avLst/>
+          </a:prstGeom>
+        </p:spPr>
+      </p:pic>
+    </p:spTree>
+  </p:cSld>
+  <p:clrMapOvr>
+    <a:masterClrMapping/>
+  </p:clrMapOvr>
+</p:sld>
+</file>
+
+<file path=ppt/slides/slide7.xml><?xml version="1.0" encoding="utf-8"?>
+<p:sld xmlns:a="http://schemas.openxmlformats.org/drawingml/2006/main" xmlns:p="http://schemas.openxmlformats.org/presentationml/2006/main" xmlns:r="http://schemas.openxmlformats.org/officeDocument/2006/relationships">
+  <p:cSld>
+    <p:spTree>
+      <p:nvGrpSpPr>
+        <p:cNvPr id="1" name=""/>
+        <p:cNvGrpSpPr/>
+        <p:nvPr/>
+      </p:nvGrpSpPr>
+      <p:grpSpPr/>
+      <p:sp>
+        <p:nvSpPr>
+          <p:cNvPr id="2" name="Title 1"/>
+          <p:cNvSpPr>
+            <a:spLocks noGrp="1"/>
+          </p:cNvSpPr>
+          <p:nvPr>
+            <p:ph type="title"/>
+          </p:nvPr>
+        </p:nvSpPr>
+        <p:spPr/>
+        <p:txBody>
+          <a:bodyPr/>
+          <a:lstStyle/>
+          <a:p/>
+        </p:txBody>
+      </p:sp>
+      <p:pic>
+        <p:nvPicPr>
+          <p:cNvPr id="3" name="Picture 2" descr="temp_img.jpg"/>
+          <p:cNvPicPr>
+            <a:picLocks noChangeAspect="1"/>
+          </p:cNvPicPr>
+          <p:nvPr/>
+        </p:nvPicPr>
+        <p:blipFill>
+          <a:blip r:embed="rId2"/>
+          <a:stretch>
+            <a:fillRect/>
+          </a:stretch>
+        </p:blipFill>
+        <p:spPr>
+          <a:xfrm>
+            <a:off x="0" y="0"/>
+            <a:ext cx="9144000" cy="6858000"/>
+          </a:xfrm>
+          <a:prstGeom prst="rect">
+            <a:avLst/>
+          </a:prstGeom>
+        </p:spPr>
+      </p:pic>
+    </p:spTree>
+  </p:cSld>
+  <p:clrMapOvr>
+    <a:masterClrMapping/>
+  </p:clrMapOvr>
+</p:sld>
+</file>
+
+<file path=ppt/slides/slide8.xml><?xml version="1.0" encoding="utf-8"?>
+<p:sld xmlns:a="http://schemas.openxmlformats.org/drawingml/2006/main" xmlns:p="http://schemas.openxmlformats.org/presentationml/2006/main" xmlns:r="http://schemas.openxmlformats.org/officeDocument/2006/relationships">
+  <p:cSld>
+    <p:spTree>
+      <p:nvGrpSpPr>
+        <p:cNvPr id="1" name=""/>
+        <p:cNvGrpSpPr/>
+        <p:nvPr/>
+      </p:nvGrpSpPr>
+      <p:grpSpPr/>
+      <p:sp>
+        <p:nvSpPr>
+          <p:cNvPr id="2" name="Title 1"/>
+          <p:cNvSpPr>
+            <a:spLocks noGrp="1"/>
+          </p:cNvSpPr>
+          <p:nvPr>
+            <p:ph type="title"/>
+          </p:nvPr>
+        </p:nvSpPr>
+        <p:spPr/>
+        <p:txBody>
+          <a:bodyPr/>
+          <a:lstStyle/>
+          <a:p/>
+        </p:txBody>
+      </p:sp>
+      <p:pic>
+        <p:nvPicPr>
+          <p:cNvPr id="3" name="Picture 2" descr="temp_img.jpg"/>
+          <p:cNvPicPr>
+            <a:picLocks noChangeAspect="1"/>
+          </p:cNvPicPr>
+          <p:nvPr/>
+        </p:nvPicPr>
+        <p:blipFill>
+          <a:blip r:embed="rId2"/>
+          <a:stretch>
+            <a:fillRect/>
+          </a:stretch>
+        </p:blipFill>
+        <p:spPr>
+          <a:xfrm>
+            <a:off x="0" y="0"/>
+            <a:ext cx="9144000" cy="6858000"/>
+          </a:xfrm>
+          <a:prstGeom prst="rect">
+            <a:avLst/>
+          </a:prstGeom>
+        </p:spPr>
+      </p:pic>
+    </p:spTree>
+  </p:cSld>
+  <p:clrMapOvr>
+    <a:masterClrMapping/>
+  </p:clrMapOvr>
+</p:sld>
+</file>
+
+<file path=ppt/slides/slide9.xml><?xml version="1.0" encoding="utf-8"?>
+<p:sld xmlns:a="http://schemas.openxmlformats.org/drawingml/2006/main" xmlns:p="http://schemas.openxmlformats.org/presentationml/2006/main" xmlns:r="http://schemas.openxmlformats.org/officeDocument/2006/relationships">
+  <p:cSld>
+    <p:spTree>
+      <p:nvGrpSpPr>
+        <p:cNvPr id="1" name=""/>
+        <p:cNvGrpSpPr/>
+        <p:nvPr/>
+      </p:nvGrpSpPr>
+      <p:grpSpPr/>
+      <p:sp>
+        <p:nvSpPr>
+          <p:cNvPr id="2" name="Title 1"/>
+          <p:cNvSpPr>
+            <a:spLocks noGrp="1"/>
+          </p:cNvSpPr>
+          <p:nvPr>
+            <p:ph type="title"/>
+          </p:nvPr>
+        </p:nvSpPr>
+        <p:spPr/>
+        <p:txBody>
+          <a:bodyPr/>
+          <a:lstStyle/>
+          <a:p/>
+        </p:txBody>
+      </p:sp>
+      <p:pic>
+        <p:nvPicPr>
+          <p:cNvPr id="3" name="Picture 2" descr="temp_img.jpg"/>
+          <p:cNvPicPr>
+            <a:picLocks noChangeAspect="1"/>
+          </p:cNvPicPr>
+          <p:nvPr/>
+        </p:nvPicPr>
+        <p:blipFill>
+          <a:blip r:embed="rId2"/>
+          <a:stretch>
+            <a:fillRect/>
+          </a:stretch>
+        </p:blipFill>
+        <p:spPr>
+          <a:xfrm>
+            <a:off x="0" y="0"/>
+            <a:ext cx="9144000" cy="6858000"/>
           </a:xfrm>
           <a:prstGeom prst="rect">
             <a:avLst/>

</xml_diff>

<commit_message>
Added possibility of specifying aspect ratio. Check README.md for details.
</commit_message>
<xml_diff>
--- a/test/test_data/output.pptx
+++ b/test/test_data/output.pptx
@@ -9,17 +9,8 @@
     <p:sldId id="257" r:id="rId8"/>
     <p:sldId id="258" r:id="rId9"/>
     <p:sldId id="259" r:id="rId10"/>
-    <p:sldId id="260" r:id="rId11"/>
-    <p:sldId id="261" r:id="rId12"/>
-    <p:sldId id="262" r:id="rId13"/>
-    <p:sldId id="263" r:id="rId14"/>
-    <p:sldId id="264" r:id="rId15"/>
-    <p:sldId id="265" r:id="rId16"/>
-    <p:sldId id="266" r:id="rId17"/>
-    <p:sldId id="267" r:id="rId18"/>
-    <p:sldId id="268" r:id="rId19"/>
   </p:sldIdLst>
-  <p:sldSz cx="9144000" cy="6858000" type="screen4x3"/>
+  <p:sldSz cx="3657600" cy="2743200" type="screen4x3"/>
   <p:notesSz cx="6858000" cy="9144000"/>
   <p:defaultTextStyle>
     <a:defPPr>
@@ -3119,7 +3110,7 @@
       </p:sp>
       <p:pic>
         <p:nvPicPr>
-          <p:cNvPr id="3" name="Picture 2" descr="temp_img.jpg"/>
+          <p:cNvPr id="3" name="Picture 2" descr="test_page-0001.jpg"/>
           <p:cNvPicPr>
             <a:picLocks noChangeAspect="1"/>
           </p:cNvPicPr>
@@ -3134,243 +3125,7 @@
         <p:spPr>
           <a:xfrm>
             <a:off x="0" y="0"/>
-            <a:ext cx="9144000" cy="6858000"/>
-          </a:xfrm>
-          <a:prstGeom prst="rect">
-            <a:avLst/>
-          </a:prstGeom>
-        </p:spPr>
-      </p:pic>
-    </p:spTree>
-  </p:cSld>
-  <p:clrMapOvr>
-    <a:masterClrMapping/>
-  </p:clrMapOvr>
-</p:sld>
-</file>
-
-<file path=ppt/slides/slide10.xml><?xml version="1.0" encoding="utf-8"?>
-<p:sld xmlns:a="http://schemas.openxmlformats.org/drawingml/2006/main" xmlns:p="http://schemas.openxmlformats.org/presentationml/2006/main" xmlns:r="http://schemas.openxmlformats.org/officeDocument/2006/relationships">
-  <p:cSld>
-    <p:spTree>
-      <p:nvGrpSpPr>
-        <p:cNvPr id="1" name=""/>
-        <p:cNvGrpSpPr/>
-        <p:nvPr/>
-      </p:nvGrpSpPr>
-      <p:grpSpPr/>
-      <p:sp>
-        <p:nvSpPr>
-          <p:cNvPr id="2" name="Title 1"/>
-          <p:cNvSpPr>
-            <a:spLocks noGrp="1"/>
-          </p:cNvSpPr>
-          <p:nvPr>
-            <p:ph type="title"/>
-          </p:nvPr>
-        </p:nvSpPr>
-        <p:spPr/>
-        <p:txBody>
-          <a:bodyPr/>
-          <a:lstStyle/>
-          <a:p/>
-        </p:txBody>
-      </p:sp>
-      <p:pic>
-        <p:nvPicPr>
-          <p:cNvPr id="3" name="Picture 2" descr="temp_img.jpg"/>
-          <p:cNvPicPr>
-            <a:picLocks noChangeAspect="1"/>
-          </p:cNvPicPr>
-          <p:nvPr/>
-        </p:nvPicPr>
-        <p:blipFill>
-          <a:blip r:embed="rId2"/>
-          <a:stretch>
-            <a:fillRect/>
-          </a:stretch>
-        </p:blipFill>
-        <p:spPr>
-          <a:xfrm>
-            <a:off x="0" y="0"/>
-            <a:ext cx="9144000" cy="6858000"/>
-          </a:xfrm>
-          <a:prstGeom prst="rect">
-            <a:avLst/>
-          </a:prstGeom>
-        </p:spPr>
-      </p:pic>
-    </p:spTree>
-  </p:cSld>
-  <p:clrMapOvr>
-    <a:masterClrMapping/>
-  </p:clrMapOvr>
-</p:sld>
-</file>
-
-<file path=ppt/slides/slide11.xml><?xml version="1.0" encoding="utf-8"?>
-<p:sld xmlns:a="http://schemas.openxmlformats.org/drawingml/2006/main" xmlns:p="http://schemas.openxmlformats.org/presentationml/2006/main" xmlns:r="http://schemas.openxmlformats.org/officeDocument/2006/relationships">
-  <p:cSld>
-    <p:spTree>
-      <p:nvGrpSpPr>
-        <p:cNvPr id="1" name=""/>
-        <p:cNvGrpSpPr/>
-        <p:nvPr/>
-      </p:nvGrpSpPr>
-      <p:grpSpPr/>
-      <p:sp>
-        <p:nvSpPr>
-          <p:cNvPr id="2" name="Title 1"/>
-          <p:cNvSpPr>
-            <a:spLocks noGrp="1"/>
-          </p:cNvSpPr>
-          <p:nvPr>
-            <p:ph type="title"/>
-          </p:nvPr>
-        </p:nvSpPr>
-        <p:spPr/>
-        <p:txBody>
-          <a:bodyPr/>
-          <a:lstStyle/>
-          <a:p/>
-        </p:txBody>
-      </p:sp>
-      <p:pic>
-        <p:nvPicPr>
-          <p:cNvPr id="3" name="Picture 2" descr="temp_img.jpg"/>
-          <p:cNvPicPr>
-            <a:picLocks noChangeAspect="1"/>
-          </p:cNvPicPr>
-          <p:nvPr/>
-        </p:nvPicPr>
-        <p:blipFill>
-          <a:blip r:embed="rId2"/>
-          <a:stretch>
-            <a:fillRect/>
-          </a:stretch>
-        </p:blipFill>
-        <p:spPr>
-          <a:xfrm>
-            <a:off x="0" y="0"/>
-            <a:ext cx="9144000" cy="6858000"/>
-          </a:xfrm>
-          <a:prstGeom prst="rect">
-            <a:avLst/>
-          </a:prstGeom>
-        </p:spPr>
-      </p:pic>
-    </p:spTree>
-  </p:cSld>
-  <p:clrMapOvr>
-    <a:masterClrMapping/>
-  </p:clrMapOvr>
-</p:sld>
-</file>
-
-<file path=ppt/slides/slide12.xml><?xml version="1.0" encoding="utf-8"?>
-<p:sld xmlns:a="http://schemas.openxmlformats.org/drawingml/2006/main" xmlns:p="http://schemas.openxmlformats.org/presentationml/2006/main" xmlns:r="http://schemas.openxmlformats.org/officeDocument/2006/relationships">
-  <p:cSld>
-    <p:spTree>
-      <p:nvGrpSpPr>
-        <p:cNvPr id="1" name=""/>
-        <p:cNvGrpSpPr/>
-        <p:nvPr/>
-      </p:nvGrpSpPr>
-      <p:grpSpPr/>
-      <p:sp>
-        <p:nvSpPr>
-          <p:cNvPr id="2" name="Title 1"/>
-          <p:cNvSpPr>
-            <a:spLocks noGrp="1"/>
-          </p:cNvSpPr>
-          <p:nvPr>
-            <p:ph type="title"/>
-          </p:nvPr>
-        </p:nvSpPr>
-        <p:spPr/>
-        <p:txBody>
-          <a:bodyPr/>
-          <a:lstStyle/>
-          <a:p/>
-        </p:txBody>
-      </p:sp>
-      <p:pic>
-        <p:nvPicPr>
-          <p:cNvPr id="3" name="Picture 2" descr="temp_img.jpg"/>
-          <p:cNvPicPr>
-            <a:picLocks noChangeAspect="1"/>
-          </p:cNvPicPr>
-          <p:nvPr/>
-        </p:nvPicPr>
-        <p:blipFill>
-          <a:blip r:embed="rId2"/>
-          <a:stretch>
-            <a:fillRect/>
-          </a:stretch>
-        </p:blipFill>
-        <p:spPr>
-          <a:xfrm>
-            <a:off x="0" y="0"/>
-            <a:ext cx="9144000" cy="6858000"/>
-          </a:xfrm>
-          <a:prstGeom prst="rect">
-            <a:avLst/>
-          </a:prstGeom>
-        </p:spPr>
-      </p:pic>
-    </p:spTree>
-  </p:cSld>
-  <p:clrMapOvr>
-    <a:masterClrMapping/>
-  </p:clrMapOvr>
-</p:sld>
-</file>
-
-<file path=ppt/slides/slide13.xml><?xml version="1.0" encoding="utf-8"?>
-<p:sld xmlns:a="http://schemas.openxmlformats.org/drawingml/2006/main" xmlns:p="http://schemas.openxmlformats.org/presentationml/2006/main" xmlns:r="http://schemas.openxmlformats.org/officeDocument/2006/relationships">
-  <p:cSld>
-    <p:spTree>
-      <p:nvGrpSpPr>
-        <p:cNvPr id="1" name=""/>
-        <p:cNvGrpSpPr/>
-        <p:nvPr/>
-      </p:nvGrpSpPr>
-      <p:grpSpPr/>
-      <p:sp>
-        <p:nvSpPr>
-          <p:cNvPr id="2" name="Title 1"/>
-          <p:cNvSpPr>
-            <a:spLocks noGrp="1"/>
-          </p:cNvSpPr>
-          <p:nvPr>
-            <p:ph type="title"/>
-          </p:nvPr>
-        </p:nvSpPr>
-        <p:spPr/>
-        <p:txBody>
-          <a:bodyPr/>
-          <a:lstStyle/>
-          <a:p/>
-        </p:txBody>
-      </p:sp>
-      <p:pic>
-        <p:nvPicPr>
-          <p:cNvPr id="3" name="Picture 2" descr="temp_img.jpg"/>
-          <p:cNvPicPr>
-            <a:picLocks noChangeAspect="1"/>
-          </p:cNvPicPr>
-          <p:nvPr/>
-        </p:nvPicPr>
-        <p:blipFill>
-          <a:blip r:embed="rId2"/>
-          <a:stretch>
-            <a:fillRect/>
-          </a:stretch>
-        </p:blipFill>
-        <p:spPr>
-          <a:xfrm>
-            <a:off x="0" y="0"/>
-            <a:ext cx="9144000" cy="6858000"/>
+            <a:ext cx="3657600" cy="2743200"/>
           </a:xfrm>
           <a:prstGeom prst="rect">
             <a:avLst/>
@@ -3414,7 +3169,7 @@
       </p:sp>
       <p:pic>
         <p:nvPicPr>
-          <p:cNvPr id="3" name="Picture 2" descr="temp_img.jpg"/>
+          <p:cNvPr id="3" name="Picture 2" descr="test_page-0002.jpg"/>
           <p:cNvPicPr>
             <a:picLocks noChangeAspect="1"/>
           </p:cNvPicPr>
@@ -3429,7 +3184,7 @@
         <p:spPr>
           <a:xfrm>
             <a:off x="0" y="0"/>
-            <a:ext cx="9144000" cy="6858000"/>
+            <a:ext cx="3657600" cy="2743200"/>
           </a:xfrm>
           <a:prstGeom prst="rect">
             <a:avLst/>
@@ -3473,7 +3228,7 @@
       </p:sp>
       <p:pic>
         <p:nvPicPr>
-          <p:cNvPr id="3" name="Picture 2" descr="temp_img.jpg"/>
+          <p:cNvPr id="3" name="Picture 2" descr="test_page-0003.jpg"/>
           <p:cNvPicPr>
             <a:picLocks noChangeAspect="1"/>
           </p:cNvPicPr>
@@ -3488,7 +3243,7 @@
         <p:spPr>
           <a:xfrm>
             <a:off x="0" y="0"/>
-            <a:ext cx="9144000" cy="6858000"/>
+            <a:ext cx="3657600" cy="2743200"/>
           </a:xfrm>
           <a:prstGeom prst="rect">
             <a:avLst/>
@@ -3532,7 +3287,7 @@
       </p:sp>
       <p:pic>
         <p:nvPicPr>
-          <p:cNvPr id="3" name="Picture 2" descr="temp_img.jpg"/>
+          <p:cNvPr id="3" name="Picture 2" descr="test_page-0004.jpg"/>
           <p:cNvPicPr>
             <a:picLocks noChangeAspect="1"/>
           </p:cNvPicPr>
@@ -3547,302 +3302,7 @@
         <p:spPr>
           <a:xfrm>
             <a:off x="0" y="0"/>
-            <a:ext cx="9144000" cy="6858000"/>
-          </a:xfrm>
-          <a:prstGeom prst="rect">
-            <a:avLst/>
-          </a:prstGeom>
-        </p:spPr>
-      </p:pic>
-    </p:spTree>
-  </p:cSld>
-  <p:clrMapOvr>
-    <a:masterClrMapping/>
-  </p:clrMapOvr>
-</p:sld>
-</file>
-
-<file path=ppt/slides/slide5.xml><?xml version="1.0" encoding="utf-8"?>
-<p:sld xmlns:a="http://schemas.openxmlformats.org/drawingml/2006/main" xmlns:p="http://schemas.openxmlformats.org/presentationml/2006/main" xmlns:r="http://schemas.openxmlformats.org/officeDocument/2006/relationships">
-  <p:cSld>
-    <p:spTree>
-      <p:nvGrpSpPr>
-        <p:cNvPr id="1" name=""/>
-        <p:cNvGrpSpPr/>
-        <p:nvPr/>
-      </p:nvGrpSpPr>
-      <p:grpSpPr/>
-      <p:sp>
-        <p:nvSpPr>
-          <p:cNvPr id="2" name="Title 1"/>
-          <p:cNvSpPr>
-            <a:spLocks noGrp="1"/>
-          </p:cNvSpPr>
-          <p:nvPr>
-            <p:ph type="title"/>
-          </p:nvPr>
-        </p:nvSpPr>
-        <p:spPr/>
-        <p:txBody>
-          <a:bodyPr/>
-          <a:lstStyle/>
-          <a:p/>
-        </p:txBody>
-      </p:sp>
-      <p:pic>
-        <p:nvPicPr>
-          <p:cNvPr id="3" name="Picture 2" descr="temp_img.jpg"/>
-          <p:cNvPicPr>
-            <a:picLocks noChangeAspect="1"/>
-          </p:cNvPicPr>
-          <p:nvPr/>
-        </p:nvPicPr>
-        <p:blipFill>
-          <a:blip r:embed="rId2"/>
-          <a:stretch>
-            <a:fillRect/>
-          </a:stretch>
-        </p:blipFill>
-        <p:spPr>
-          <a:xfrm>
-            <a:off x="0" y="0"/>
-            <a:ext cx="9144000" cy="6858000"/>
-          </a:xfrm>
-          <a:prstGeom prst="rect">
-            <a:avLst/>
-          </a:prstGeom>
-        </p:spPr>
-      </p:pic>
-    </p:spTree>
-  </p:cSld>
-  <p:clrMapOvr>
-    <a:masterClrMapping/>
-  </p:clrMapOvr>
-</p:sld>
-</file>
-
-<file path=ppt/slides/slide6.xml><?xml version="1.0" encoding="utf-8"?>
-<p:sld xmlns:a="http://schemas.openxmlformats.org/drawingml/2006/main" xmlns:p="http://schemas.openxmlformats.org/presentationml/2006/main" xmlns:r="http://schemas.openxmlformats.org/officeDocument/2006/relationships">
-  <p:cSld>
-    <p:spTree>
-      <p:nvGrpSpPr>
-        <p:cNvPr id="1" name=""/>
-        <p:cNvGrpSpPr/>
-        <p:nvPr/>
-      </p:nvGrpSpPr>
-      <p:grpSpPr/>
-      <p:sp>
-        <p:nvSpPr>
-          <p:cNvPr id="2" name="Title 1"/>
-          <p:cNvSpPr>
-            <a:spLocks noGrp="1"/>
-          </p:cNvSpPr>
-          <p:nvPr>
-            <p:ph type="title"/>
-          </p:nvPr>
-        </p:nvSpPr>
-        <p:spPr/>
-        <p:txBody>
-          <a:bodyPr/>
-          <a:lstStyle/>
-          <a:p/>
-        </p:txBody>
-      </p:sp>
-      <p:pic>
-        <p:nvPicPr>
-          <p:cNvPr id="3" name="Picture 2" descr="temp_img.jpg"/>
-          <p:cNvPicPr>
-            <a:picLocks noChangeAspect="1"/>
-          </p:cNvPicPr>
-          <p:nvPr/>
-        </p:nvPicPr>
-        <p:blipFill>
-          <a:blip r:embed="rId2"/>
-          <a:stretch>
-            <a:fillRect/>
-          </a:stretch>
-        </p:blipFill>
-        <p:spPr>
-          <a:xfrm>
-            <a:off x="0" y="0"/>
-            <a:ext cx="9144000" cy="6858000"/>
-          </a:xfrm>
-          <a:prstGeom prst="rect">
-            <a:avLst/>
-          </a:prstGeom>
-        </p:spPr>
-      </p:pic>
-    </p:spTree>
-  </p:cSld>
-  <p:clrMapOvr>
-    <a:masterClrMapping/>
-  </p:clrMapOvr>
-</p:sld>
-</file>
-
-<file path=ppt/slides/slide7.xml><?xml version="1.0" encoding="utf-8"?>
-<p:sld xmlns:a="http://schemas.openxmlformats.org/drawingml/2006/main" xmlns:p="http://schemas.openxmlformats.org/presentationml/2006/main" xmlns:r="http://schemas.openxmlformats.org/officeDocument/2006/relationships">
-  <p:cSld>
-    <p:spTree>
-      <p:nvGrpSpPr>
-        <p:cNvPr id="1" name=""/>
-        <p:cNvGrpSpPr/>
-        <p:nvPr/>
-      </p:nvGrpSpPr>
-      <p:grpSpPr/>
-      <p:sp>
-        <p:nvSpPr>
-          <p:cNvPr id="2" name="Title 1"/>
-          <p:cNvSpPr>
-            <a:spLocks noGrp="1"/>
-          </p:cNvSpPr>
-          <p:nvPr>
-            <p:ph type="title"/>
-          </p:nvPr>
-        </p:nvSpPr>
-        <p:spPr/>
-        <p:txBody>
-          <a:bodyPr/>
-          <a:lstStyle/>
-          <a:p/>
-        </p:txBody>
-      </p:sp>
-      <p:pic>
-        <p:nvPicPr>
-          <p:cNvPr id="3" name="Picture 2" descr="temp_img.jpg"/>
-          <p:cNvPicPr>
-            <a:picLocks noChangeAspect="1"/>
-          </p:cNvPicPr>
-          <p:nvPr/>
-        </p:nvPicPr>
-        <p:blipFill>
-          <a:blip r:embed="rId2"/>
-          <a:stretch>
-            <a:fillRect/>
-          </a:stretch>
-        </p:blipFill>
-        <p:spPr>
-          <a:xfrm>
-            <a:off x="0" y="0"/>
-            <a:ext cx="9144000" cy="6858000"/>
-          </a:xfrm>
-          <a:prstGeom prst="rect">
-            <a:avLst/>
-          </a:prstGeom>
-        </p:spPr>
-      </p:pic>
-    </p:spTree>
-  </p:cSld>
-  <p:clrMapOvr>
-    <a:masterClrMapping/>
-  </p:clrMapOvr>
-</p:sld>
-</file>
-
-<file path=ppt/slides/slide8.xml><?xml version="1.0" encoding="utf-8"?>
-<p:sld xmlns:a="http://schemas.openxmlformats.org/drawingml/2006/main" xmlns:p="http://schemas.openxmlformats.org/presentationml/2006/main" xmlns:r="http://schemas.openxmlformats.org/officeDocument/2006/relationships">
-  <p:cSld>
-    <p:spTree>
-      <p:nvGrpSpPr>
-        <p:cNvPr id="1" name=""/>
-        <p:cNvGrpSpPr/>
-        <p:nvPr/>
-      </p:nvGrpSpPr>
-      <p:grpSpPr/>
-      <p:sp>
-        <p:nvSpPr>
-          <p:cNvPr id="2" name="Title 1"/>
-          <p:cNvSpPr>
-            <a:spLocks noGrp="1"/>
-          </p:cNvSpPr>
-          <p:nvPr>
-            <p:ph type="title"/>
-          </p:nvPr>
-        </p:nvSpPr>
-        <p:spPr/>
-        <p:txBody>
-          <a:bodyPr/>
-          <a:lstStyle/>
-          <a:p/>
-        </p:txBody>
-      </p:sp>
-      <p:pic>
-        <p:nvPicPr>
-          <p:cNvPr id="3" name="Picture 2" descr="temp_img.jpg"/>
-          <p:cNvPicPr>
-            <a:picLocks noChangeAspect="1"/>
-          </p:cNvPicPr>
-          <p:nvPr/>
-        </p:nvPicPr>
-        <p:blipFill>
-          <a:blip r:embed="rId2"/>
-          <a:stretch>
-            <a:fillRect/>
-          </a:stretch>
-        </p:blipFill>
-        <p:spPr>
-          <a:xfrm>
-            <a:off x="0" y="0"/>
-            <a:ext cx="9144000" cy="6858000"/>
-          </a:xfrm>
-          <a:prstGeom prst="rect">
-            <a:avLst/>
-          </a:prstGeom>
-        </p:spPr>
-      </p:pic>
-    </p:spTree>
-  </p:cSld>
-  <p:clrMapOvr>
-    <a:masterClrMapping/>
-  </p:clrMapOvr>
-</p:sld>
-</file>
-
-<file path=ppt/slides/slide9.xml><?xml version="1.0" encoding="utf-8"?>
-<p:sld xmlns:a="http://schemas.openxmlformats.org/drawingml/2006/main" xmlns:p="http://schemas.openxmlformats.org/presentationml/2006/main" xmlns:r="http://schemas.openxmlformats.org/officeDocument/2006/relationships">
-  <p:cSld>
-    <p:spTree>
-      <p:nvGrpSpPr>
-        <p:cNvPr id="1" name=""/>
-        <p:cNvGrpSpPr/>
-        <p:nvPr/>
-      </p:nvGrpSpPr>
-      <p:grpSpPr/>
-      <p:sp>
-        <p:nvSpPr>
-          <p:cNvPr id="2" name="Title 1"/>
-          <p:cNvSpPr>
-            <a:spLocks noGrp="1"/>
-          </p:cNvSpPr>
-          <p:nvPr>
-            <p:ph type="title"/>
-          </p:nvPr>
-        </p:nvSpPr>
-        <p:spPr/>
-        <p:txBody>
-          <a:bodyPr/>
-          <a:lstStyle/>
-          <a:p/>
-        </p:txBody>
-      </p:sp>
-      <p:pic>
-        <p:nvPicPr>
-          <p:cNvPr id="3" name="Picture 2" descr="temp_img.jpg"/>
-          <p:cNvPicPr>
-            <a:picLocks noChangeAspect="1"/>
-          </p:cNvPicPr>
-          <p:nvPr/>
-        </p:nvPicPr>
-        <p:blipFill>
-          <a:blip r:embed="rId2"/>
-          <a:stretch>
-            <a:fillRect/>
-          </a:stretch>
-        </p:blipFill>
-        <p:spPr>
-          <a:xfrm>
-            <a:off x="0" y="0"/>
-            <a:ext cx="9144000" cy="6858000"/>
+            <a:ext cx="3657600" cy="2743200"/>
           </a:xfrm>
           <a:prstGeom prst="rect">
             <a:avLst/>

</xml_diff>